<commit_message>
with animated gif on front page
</commit_message>
<xml_diff>
--- a/journal.pptx
+++ b/journal.pptx
@@ -5,7 +5,7 @@
     <p:sldMasterId id="2147483648" r:id="rId1"/>
   </p:sldMasterIdLst>
   <p:notesMasterIdLst>
-    <p:notesMasterId r:id="rId21"/>
+    <p:notesMasterId r:id="rId22"/>
   </p:notesMasterIdLst>
   <p:sldIdLst>
     <p:sldId id="256" r:id="rId2"/>
@@ -27,6 +27,7 @@
     <p:sldId id="274" r:id="rId18"/>
     <p:sldId id="273" r:id="rId19"/>
     <p:sldId id="276" r:id="rId20"/>
+    <p:sldId id="277" r:id="rId21"/>
   </p:sldIdLst>
   <p:sldSz cx="9144000" cy="6858000" type="screen4x3"/>
   <p:notesSz cx="6946900" cy="9220200"/>
@@ -127,7 +128,7 @@
   </p:defaultTextStyle>
   <p:extLst>
     <p:ext uri="{EFAFB233-063F-42B5-8137-9DF3F51BA10A}">
-      <p15:sldGuideLst xmlns="" xmlns:p15="http://schemas.microsoft.com/office/powerpoint/2012/main">
+      <p15:sldGuideLst xmlns:p15="http://schemas.microsoft.com/office/powerpoint/2012/main" xmlns="">
         <p15:guide id="1" orient="horz" pos="218">
           <p15:clr>
             <a:srgbClr val="A4A3A4"/>
@@ -5889,6 +5890,39 @@
           </a:p>
         </p:txBody>
       </p:sp>
+      <p:pic>
+        <p:nvPicPr>
+          <p:cNvPr id="7" name="Prisoner_of_Azkaban_-_Sirius_Black.gif">
+            <a:hlinkClick r:id="" action="ppaction://media"/>
+          </p:cNvPr>
+          <p:cNvPicPr>
+            <a:picLocks noChangeAspect="1"/>
+          </p:cNvPicPr>
+          <p:nvPr>
+            <a:videoFile r:link="rId2"/>
+            <p:extLst>
+              <p:ext uri="{DAA4B4D4-6D71-4841-9C94-3DE7FCFB9230}">
+                <p14:media xmlns:p14="http://schemas.microsoft.com/office/powerpoint/2010/main" r:embed="rId1"/>
+              </p:ext>
+            </p:extLst>
+          </p:nvPr>
+        </p:nvPicPr>
+        <p:blipFill>
+          <a:blip r:embed="rId4"/>
+          <a:stretch>
+            <a:fillRect/>
+          </a:stretch>
+        </p:blipFill>
+        <p:spPr>
+          <a:xfrm>
+            <a:off x="2555776" y="2132856"/>
+            <a:ext cx="4762500" cy="2009775"/>
+          </a:xfrm>
+          <a:prstGeom prst="rect">
+            <a:avLst/>
+          </a:prstGeom>
+        </p:spPr>
+      </p:pic>
     </p:spTree>
     <p:extLst>
       <p:ext uri="{BB962C8B-B14F-4D97-AF65-F5344CB8AC3E}">
@@ -5911,6 +5945,86 @@
       </p:transition>
     </mc:Fallback>
   </mc:AlternateContent>
+  <p:timing>
+    <p:tnLst>
+      <p:par>
+        <p:cTn id="1" dur="indefinite" restart="never" nodeType="tmRoot">
+          <p:childTnLst>
+            <p:seq concurrent="1" nextAc="seek">
+              <p:cTn id="2" restart="whenNotActive" fill="hold" evtFilter="cancelBubble" nodeType="interactiveSeq">
+                <p:stCondLst>
+                  <p:cond evt="onClick" delay="0">
+                    <p:tgtEl>
+                      <p:spTgt spid="7"/>
+                    </p:tgtEl>
+                  </p:cond>
+                </p:stCondLst>
+                <p:endSync evt="end" delay="0">
+                  <p:rtn val="all"/>
+                </p:endSync>
+                <p:childTnLst>
+                  <p:par>
+                    <p:cTn id="3" fill="hold">
+                      <p:stCondLst>
+                        <p:cond delay="0"/>
+                      </p:stCondLst>
+                      <p:childTnLst>
+                        <p:par>
+                          <p:cTn id="4" fill="hold">
+                            <p:stCondLst>
+                              <p:cond delay="0"/>
+                            </p:stCondLst>
+                            <p:childTnLst>
+                              <p:par>
+                                <p:cTn id="5" presetID="2" presetClass="mediacall" presetSubtype="0" fill="hold" nodeType="clickEffect">
+                                  <p:stCondLst>
+                                    <p:cond delay="0"/>
+                                  </p:stCondLst>
+                                  <p:childTnLst>
+                                    <p:cmd type="call" cmd="togglePause">
+                                      <p:cBhvr>
+                                        <p:cTn id="6" dur="1" fill="hold"/>
+                                        <p:tgtEl>
+                                          <p:spTgt spid="7"/>
+                                        </p:tgtEl>
+                                      </p:cBhvr>
+                                    </p:cmd>
+                                  </p:childTnLst>
+                                </p:cTn>
+                              </p:par>
+                            </p:childTnLst>
+                          </p:cTn>
+                        </p:par>
+                      </p:childTnLst>
+                    </p:cTn>
+                  </p:par>
+                </p:childTnLst>
+              </p:cTn>
+              <p:nextCondLst>
+                <p:cond evt="onClick" delay="0">
+                  <p:tgtEl>
+                    <p:spTgt spid="7"/>
+                  </p:tgtEl>
+                </p:cond>
+              </p:nextCondLst>
+            </p:seq>
+            <p:video>
+              <p:cMediaNode vol="80000">
+                <p:cTn id="7" fill="hold" display="0">
+                  <p:stCondLst>
+                    <p:cond delay="indefinite"/>
+                  </p:stCondLst>
+                </p:cTn>
+                <p:tgtEl>
+                  <p:spTgt spid="7"/>
+                </p:tgtEl>
+              </p:cMediaNode>
+            </p:video>
+          </p:childTnLst>
+        </p:cTn>
+      </p:par>
+    </p:tnLst>
+  </p:timing>
 </p:sld>
 </file>
 
@@ -7061,6 +7175,13 @@
       </p:transition>
     </mc:Fallback>
   </mc:AlternateContent>
+  <p:timing>
+    <p:tnLst>
+      <p:par>
+        <p:cTn id="1" dur="indefinite" restart="never" nodeType="tmRoot"/>
+      </p:par>
+    </p:tnLst>
+  </p:timing>
 </p:sld>
 </file>
 
@@ -8929,6 +9050,13 @@
       </p:transition>
     </mc:Fallback>
   </mc:AlternateContent>
+  <p:timing>
+    <p:tnLst>
+      <p:par>
+        <p:cTn id="1" dur="indefinite" restart="never" nodeType="tmRoot"/>
+      </p:par>
+    </p:tnLst>
+  </p:timing>
 </p:sld>
 </file>
 
@@ -11093,6 +11221,13 @@
       </p:transition>
     </mc:Fallback>
   </mc:AlternateContent>
+  <p:timing>
+    <p:tnLst>
+      <p:par>
+        <p:cTn id="1" dur="indefinite" restart="never" nodeType="tmRoot"/>
+      </p:par>
+    </p:tnLst>
+  </p:timing>
 </p:sld>
 </file>
 
@@ -12326,6 +12461,13 @@
       </p:transition>
     </mc:Fallback>
   </mc:AlternateContent>
+  <p:timing>
+    <p:tnLst>
+      <p:par>
+        <p:cTn id="1" dur="indefinite" restart="never" nodeType="tmRoot"/>
+      </p:par>
+    </p:tnLst>
+  </p:timing>
 </p:sld>
 </file>
 
@@ -13832,6 +13974,13 @@
       </p:transition>
     </mc:Fallback>
   </mc:AlternateContent>
+  <p:timing>
+    <p:tnLst>
+      <p:par>
+        <p:cTn id="1" dur="indefinite" restart="never" nodeType="tmRoot"/>
+      </p:par>
+    </p:tnLst>
+  </p:timing>
 </p:sld>
 </file>
 
@@ -15100,6 +15249,13 @@
       </p:transition>
     </mc:Fallback>
   </mc:AlternateContent>
+  <p:timing>
+    <p:tnLst>
+      <p:par>
+        <p:cTn id="1" dur="indefinite" restart="never" nodeType="tmRoot"/>
+      </p:par>
+    </p:tnLst>
+  </p:timing>
 </p:sld>
 </file>
 
@@ -16289,6 +16445,13 @@
       </p:transition>
     </mc:Fallback>
   </mc:AlternateContent>
+  <p:timing>
+    <p:tnLst>
+      <p:par>
+        <p:cTn id="1" dur="indefinite" restart="never" nodeType="tmRoot"/>
+      </p:par>
+    </p:tnLst>
+  </p:timing>
 </p:sld>
 </file>
 
@@ -17482,6 +17645,13 @@
       </p:transition>
     </mc:Fallback>
   </mc:AlternateContent>
+  <p:timing>
+    <p:tnLst>
+      <p:par>
+        <p:cTn id="1" dur="indefinite" restart="never" nodeType="tmRoot"/>
+      </p:par>
+    </p:tnLst>
+  </p:timing>
 </p:sld>
 </file>
 
@@ -18877,6 +19047,13 @@
       </p:transition>
     </mc:Fallback>
   </mc:AlternateContent>
+  <p:timing>
+    <p:tnLst>
+      <p:par>
+        <p:cTn id="1" dur="indefinite" restart="never" nodeType="tmRoot"/>
+      </p:par>
+    </p:tnLst>
+  </p:timing>
 </p:sld>
 </file>
 
@@ -19075,11 +19252,6 @@
               </a:rPr>
               <a:t>aggregate</a:t>
             </a:r>
-            <a:endParaRPr lang="en-GB" dirty="0" smtClean="0">
-              <a:solidFill>
-                <a:schemeClr val="bg1"/>
-              </a:solidFill>
-            </a:endParaRPr>
           </a:p>
         </p:txBody>
       </p:sp>
@@ -19154,7 +19326,6 @@
               <a:rPr lang="en-GB" sz="2400" dirty="0" smtClean="0"/>
               <a:t>Efficiency : 96.5%</a:t>
             </a:r>
-            <a:endParaRPr lang="en-GB" sz="2400" dirty="0" smtClean="0"/>
           </a:p>
         </p:txBody>
       </p:sp>
@@ -19192,7 +19363,6 @@
               <a:rPr lang="en-GB" sz="2400" dirty="0" smtClean="0"/>
               <a:t> (Boston)</a:t>
             </a:r>
-            <a:endParaRPr lang="en-GB" sz="2400" dirty="0" smtClean="0"/>
           </a:p>
         </p:txBody>
       </p:sp>
@@ -19222,7 +19392,6 @@
               <a:rPr lang="en-GB" sz="2400" dirty="0" smtClean="0"/>
               <a:t>Overall energy used : 3460 kW</a:t>
             </a:r>
-            <a:endParaRPr lang="en-GB" sz="2400" dirty="0" smtClean="0"/>
           </a:p>
         </p:txBody>
       </p:sp>
@@ -19349,6 +19518,13 @@
       </p:transition>
     </mc:Fallback>
   </mc:AlternateContent>
+  <p:timing>
+    <p:tnLst>
+      <p:par>
+        <p:cTn id="1" dur="indefinite" restart="never" nodeType="tmRoot"/>
+      </p:par>
+    </p:tnLst>
+  </p:timing>
 </p:sld>
 </file>
 
@@ -19907,6 +20083,295 @@
       </p:transition>
     </mc:Fallback>
   </mc:AlternateContent>
+  <p:timing>
+    <p:tnLst>
+      <p:par>
+        <p:cTn id="1" dur="indefinite" restart="never" nodeType="tmRoot"/>
+      </p:par>
+    </p:tnLst>
+  </p:timing>
+</p:sld>
+</file>
+
+<file path=ppt/slides/slide20.xml><?xml version="1.0" encoding="utf-8"?>
+<p:sld xmlns:a="http://schemas.openxmlformats.org/drawingml/2006/main" xmlns:r="http://schemas.openxmlformats.org/officeDocument/2006/relationships" xmlns:p="http://schemas.openxmlformats.org/presentationml/2006/main">
+  <p:cSld>
+    <p:spTree>
+      <p:nvGrpSpPr>
+        <p:cNvPr id="1" name=""/>
+        <p:cNvGrpSpPr/>
+        <p:nvPr/>
+      </p:nvGrpSpPr>
+      <p:grpSpPr>
+        <a:xfrm>
+          <a:off x="0" y="0"/>
+          <a:ext cx="0" cy="0"/>
+          <a:chOff x="0" y="0"/>
+          <a:chExt cx="0" cy="0"/>
+        </a:xfrm>
+      </p:grpSpPr>
+      <p:sp>
+        <p:nvSpPr>
+          <p:cNvPr id="6" name="Content Placeholder 5"/>
+          <p:cNvSpPr>
+            <a:spLocks noGrp="1"/>
+          </p:cNvSpPr>
+          <p:nvPr>
+            <p:ph idx="1"/>
+          </p:nvPr>
+        </p:nvSpPr>
+        <p:spPr/>
+        <p:txBody>
+          <a:bodyPr/>
+          <a:lstStyle/>
+          <a:p>
+            <a:r>
+              <a:rPr lang="en-GB" dirty="0" smtClean="0"/>
+              <a:t>Text</a:t>
+            </a:r>
+          </a:p>
+          <a:p>
+            <a:pPr lvl="1"/>
+            <a:r>
+              <a:rPr lang="en-GB" dirty="0" smtClean="0"/>
+              <a:t>Captions and blocks</a:t>
+            </a:r>
+          </a:p>
+          <a:p>
+            <a:r>
+              <a:rPr lang="en-GB" dirty="0" smtClean="0"/>
+              <a:t>Images</a:t>
+            </a:r>
+          </a:p>
+          <a:p>
+            <a:pPr lvl="1"/>
+            <a:r>
+              <a:rPr lang="en-GB" dirty="0" smtClean="0"/>
+              <a:t>2d</a:t>
+            </a:r>
+          </a:p>
+          <a:p>
+            <a:pPr lvl="1"/>
+            <a:r>
+              <a:rPr lang="en-GB" dirty="0" smtClean="0"/>
+              <a:t>3d</a:t>
+            </a:r>
+          </a:p>
+          <a:p>
+            <a:pPr lvl="1"/>
+            <a:r>
+              <a:rPr lang="en-GB" dirty="0" smtClean="0"/>
+              <a:t>movies</a:t>
+            </a:r>
+          </a:p>
+          <a:p>
+            <a:r>
+              <a:rPr lang="en-GB" dirty="0" smtClean="0"/>
+              <a:t>Graphs &amp; charts</a:t>
+            </a:r>
+          </a:p>
+          <a:p>
+            <a:pPr lvl="1"/>
+            <a:r>
+              <a:rPr lang="en-GB" dirty="0" smtClean="0"/>
+              <a:t>Individual streams</a:t>
+            </a:r>
+          </a:p>
+          <a:p>
+            <a:pPr lvl="1"/>
+            <a:r>
+              <a:rPr lang="en-GB" dirty="0" smtClean="0"/>
+              <a:t>Composite (aggregate) streams</a:t>
+            </a:r>
+          </a:p>
+          <a:p>
+            <a:r>
+              <a:rPr lang="en-GB" dirty="0" smtClean="0"/>
+              <a:t>Which is all presented in “magazine” form</a:t>
+            </a:r>
+          </a:p>
+          <a:p>
+            <a:pPr lvl="1"/>
+            <a:r>
+              <a:rPr lang="en-GB" dirty="0" smtClean="0"/>
+              <a:t>Familiar layout paradigm</a:t>
+            </a:r>
+          </a:p>
+          <a:p>
+            <a:pPr lvl="1"/>
+            <a:r>
+              <a:rPr lang="en-GB" dirty="0" smtClean="0"/>
+              <a:t>Broadsheet or tabloid form factors</a:t>
+            </a:r>
+          </a:p>
+          <a:p>
+            <a:pPr lvl="1"/>
+            <a:r>
+              <a:rPr lang="en-GB" dirty="0" smtClean="0"/>
+              <a:t>Different pages showing different views e.g. news, page3, finance, sport</a:t>
+            </a:r>
+          </a:p>
+          <a:p>
+            <a:pPr lvl="1"/>
+            <a:r>
+              <a:rPr lang="en-GB" dirty="0" smtClean="0"/>
+              <a:t>Each page can be laid out in different ways</a:t>
+            </a:r>
+          </a:p>
+          <a:p>
+            <a:pPr lvl="2"/>
+            <a:r>
+              <a:rPr lang="en-GB" dirty="0" smtClean="0"/>
+              <a:t>Content on the page can be dynamic – real-time 3d, real-time telemetry</a:t>
+            </a:r>
+          </a:p>
+          <a:p>
+            <a:pPr marL="0" indent="0">
+              <a:buNone/>
+            </a:pPr>
+            <a:endParaRPr lang="en-GB" dirty="0" smtClean="0"/>
+          </a:p>
+          <a:p>
+            <a:pPr lvl="1"/>
+            <a:endParaRPr lang="en-GB" dirty="0"/>
+          </a:p>
+        </p:txBody>
+      </p:sp>
+      <p:sp>
+        <p:nvSpPr>
+          <p:cNvPr id="2" name="Title 1"/>
+          <p:cNvSpPr>
+            <a:spLocks noGrp="1"/>
+          </p:cNvSpPr>
+          <p:nvPr>
+            <p:ph type="title"/>
+          </p:nvPr>
+        </p:nvSpPr>
+        <p:spPr/>
+        <p:txBody>
+          <a:bodyPr/>
+          <a:lstStyle/>
+          <a:p>
+            <a:r>
+              <a:rPr lang="en-GB" dirty="0" smtClean="0"/>
+              <a:t>The records can contain all sorts of (dynamic) media</a:t>
+            </a:r>
+            <a:endParaRPr lang="en-GB" dirty="0"/>
+          </a:p>
+        </p:txBody>
+      </p:sp>
+      <p:sp>
+        <p:nvSpPr>
+          <p:cNvPr id="11" name="Subtitle 10"/>
+          <p:cNvSpPr>
+            <a:spLocks noGrp="1"/>
+          </p:cNvSpPr>
+          <p:nvPr>
+            <p:ph type="subTitle" idx="15"/>
+          </p:nvPr>
+        </p:nvSpPr>
+        <p:spPr/>
+        <p:txBody>
+          <a:bodyPr/>
+          <a:lstStyle/>
+          <a:p>
+            <a:r>
+              <a:rPr lang="en-GB" dirty="0" smtClean="0"/>
+              <a:t>Based on your role</a:t>
+            </a:r>
+            <a:endParaRPr lang="en-GB" dirty="0"/>
+          </a:p>
+        </p:txBody>
+      </p:sp>
+      <p:sp>
+        <p:nvSpPr>
+          <p:cNvPr id="4" name="Footer Placeholder 3"/>
+          <p:cNvSpPr>
+            <a:spLocks noGrp="1"/>
+          </p:cNvSpPr>
+          <p:nvPr>
+            <p:ph type="ftr" sz="quarter" idx="3"/>
+          </p:nvPr>
+        </p:nvSpPr>
+        <p:spPr/>
+        <p:txBody>
+          <a:bodyPr/>
+          <a:lstStyle/>
+          <a:p>
+            <a:endParaRPr lang="en-US" dirty="0"/>
+          </a:p>
+        </p:txBody>
+      </p:sp>
+      <p:pic>
+        <p:nvPicPr>
+          <p:cNvPr id="1026" name="Picture 2" descr="http://i.dailymail.co.uk/i/pix/2009/08/20/article-1207944-06207B1F000005DC-246_468x363.jpg"/>
+          <p:cNvPicPr>
+            <a:picLocks noChangeAspect="1" noChangeArrowheads="1"/>
+          </p:cNvPicPr>
+          <p:nvPr/>
+        </p:nvPicPr>
+        <p:blipFill>
+          <a:blip r:embed="rId2">
+            <a:extLst>
+              <a:ext uri="{28A0092B-C50C-407E-A947-70E740481C1C}">
+                <a14:useLocalDpi xmlns:a14="http://schemas.microsoft.com/office/drawing/2010/main" val="0"/>
+              </a:ext>
+            </a:extLst>
+          </a:blip>
+          <a:srcRect/>
+          <a:stretch>
+            <a:fillRect/>
+          </a:stretch>
+        </p:blipFill>
+        <p:spPr bwMode="auto">
+          <a:xfrm>
+            <a:off x="4434394" y="1052736"/>
+            <a:ext cx="4457700" cy="3457576"/>
+          </a:xfrm>
+          <a:prstGeom prst="rect">
+            <a:avLst/>
+          </a:prstGeom>
+          <a:noFill/>
+          <a:extLst>
+            <a:ext uri="{909E8E84-426E-40DD-AFC4-6F175D3DCCD1}">
+              <a14:hiddenFill xmlns:a14="http://schemas.microsoft.com/office/drawing/2010/main">
+                <a:solidFill>
+                  <a:srgbClr val="FFFFFF"/>
+                </a:solidFill>
+              </a14:hiddenFill>
+            </a:ext>
+          </a:extLst>
+        </p:spPr>
+      </p:pic>
+    </p:spTree>
+    <p:extLst>
+      <p:ext uri="{BB962C8B-B14F-4D97-AF65-F5344CB8AC3E}">
+        <p14:creationId xmlns:p14="http://schemas.microsoft.com/office/powerpoint/2010/main" val="3652681068"/>
+      </p:ext>
+    </p:extLst>
+  </p:cSld>
+  <p:clrMapOvr>
+    <a:masterClrMapping/>
+  </p:clrMapOvr>
+  <mc:AlternateContent xmlns:mc="http://schemas.openxmlformats.org/markup-compatibility/2006" xmlns:p14="http://schemas.microsoft.com/office/powerpoint/2010/main">
+    <mc:Choice Requires="p14">
+      <p:transition spd="med" p14:dur="600">
+        <p:fade/>
+      </p:transition>
+    </mc:Choice>
+    <mc:Fallback xmlns="">
+      <p:transition spd="med">
+        <p:fade/>
+      </p:transition>
+    </mc:Fallback>
+  </mc:AlternateContent>
+  <p:timing>
+    <p:tnLst>
+      <p:par>
+        <p:cTn id="1" dur="indefinite" restart="never" nodeType="tmRoot"/>
+      </p:par>
+    </p:tnLst>
+  </p:timing>
 </p:sld>
 </file>
 
@@ -20860,6 +21325,13 @@
       </p:transition>
     </mc:Fallback>
   </mc:AlternateContent>
+  <p:timing>
+    <p:tnLst>
+      <p:par>
+        <p:cTn id="1" dur="indefinite" restart="never" nodeType="tmRoot"/>
+      </p:par>
+    </p:tnLst>
+  </p:timing>
 </p:sld>
 </file>
 
@@ -21319,6 +21791,13 @@
       </p:transition>
     </mc:Fallback>
   </mc:AlternateContent>
+  <p:timing>
+    <p:tnLst>
+      <p:par>
+        <p:cTn id="1" dur="indefinite" restart="never" nodeType="tmRoot"/>
+      </p:par>
+    </p:tnLst>
+  </p:timing>
 </p:sld>
 </file>
 
@@ -22224,6 +22703,13 @@
       </p:transition>
     </mc:Fallback>
   </mc:AlternateContent>
+  <p:timing>
+    <p:tnLst>
+      <p:par>
+        <p:cTn id="1" dur="indefinite" restart="never" nodeType="tmRoot"/>
+      </p:par>
+    </p:tnLst>
+  </p:timing>
 </p:sld>
 </file>
 
@@ -22514,7 +23000,7 @@
         <p:spPr>
           <a:xfrm>
             <a:off x="1691680" y="2665510"/>
-            <a:ext cx="5904656" cy="2390320"/>
+            <a:ext cx="4068452" cy="2390320"/>
           </a:xfrm>
           <a:prstGeom prst="rect">
             <a:avLst/>
@@ -22559,7 +23045,7 @@
         <p:spPr>
           <a:xfrm>
             <a:off x="2015716" y="2404397"/>
-            <a:ext cx="5904656" cy="2968819"/>
+            <a:ext cx="5004556" cy="2968819"/>
           </a:xfrm>
           <a:prstGeom prst="rect">
             <a:avLst/>
@@ -22800,6 +23286,13 @@
       </p:transition>
     </mc:Fallback>
   </mc:AlternateContent>
+  <p:timing>
+    <p:tnLst>
+      <p:par>
+        <p:cTn id="1" dur="indefinite" restart="never" nodeType="tmRoot"/>
+      </p:par>
+    </p:tnLst>
+  </p:timing>
 </p:sld>
 </file>
 
@@ -24468,7 +24961,7 @@
         <p:spPr>
           <a:xfrm>
             <a:off x="5195154" y="4941168"/>
-            <a:ext cx="644151" cy="215444"/>
+            <a:ext cx="802848" cy="215444"/>
           </a:xfrm>
           <a:prstGeom prst="rect">
             <a:avLst/>
@@ -24483,8 +24976,13 @@
           <a:p>
             <a:r>
               <a:rPr lang="en-GB" sz="1400" dirty="0" smtClean="0"/>
-              <a:t>Time = t</a:t>
-            </a:r>
+              <a:t>Time = </a:t>
+            </a:r>
+            <a:r>
+              <a:rPr lang="en-GB" sz="1400" dirty="0" smtClean="0"/>
+              <a:t>t-2</a:t>
+            </a:r>
+            <a:endParaRPr lang="en-GB" sz="1400" dirty="0" smtClean="0"/>
           </a:p>
         </p:txBody>
       </p:sp>
@@ -24512,8 +25010,9 @@
           <a:p>
             <a:r>
               <a:rPr lang="en-GB" sz="1400" dirty="0" smtClean="0"/>
-              <a:t>34</a:t>
-            </a:r>
+              <a:t>47</a:t>
+            </a:r>
+            <a:endParaRPr lang="en-GB" sz="1400" dirty="0" smtClean="0"/>
           </a:p>
         </p:txBody>
       </p:sp>
@@ -24541,8 +25040,9 @@
           <a:p>
             <a:r>
               <a:rPr lang="en-GB" sz="1400" dirty="0" smtClean="0"/>
-              <a:t>87</a:t>
-            </a:r>
+              <a:t>51</a:t>
+            </a:r>
+            <a:endParaRPr lang="en-GB" sz="1400" dirty="0" smtClean="0"/>
           </a:p>
         </p:txBody>
       </p:sp>
@@ -24570,8 +25070,9 @@
           <a:p>
             <a:r>
               <a:rPr lang="en-GB" sz="1400" dirty="0" smtClean="0"/>
-              <a:t>123</a:t>
-            </a:r>
+              <a:t>210</a:t>
+            </a:r>
+            <a:endParaRPr lang="en-GB" sz="1400" dirty="0" smtClean="0"/>
           </a:p>
         </p:txBody>
       </p:sp>
@@ -24597,6 +25098,13 @@
       </p:transition>
     </mc:Fallback>
   </mc:AlternateContent>
+  <p:timing>
+    <p:tnLst>
+      <p:par>
+        <p:cTn id="1" dur="indefinite" restart="never" nodeType="tmRoot"/>
+      </p:par>
+    </p:tnLst>
+  </p:timing>
 </p:sld>
 </file>
 
@@ -25466,6 +25974,13 @@
       </p:transition>
     </mc:Fallback>
   </mc:AlternateContent>
+  <p:timing>
+    <p:tnLst>
+      <p:par>
+        <p:cTn id="1" dur="indefinite" restart="never" nodeType="tmRoot"/>
+      </p:par>
+    </p:tnLst>
+  </p:timing>
 </p:sld>
 </file>
 
@@ -26827,6 +27342,13 @@
       </p:transition>
     </mc:Fallback>
   </mc:AlternateContent>
+  <p:timing>
+    <p:tnLst>
+      <p:par>
+        <p:cTn id="1" dur="indefinite" restart="never" nodeType="tmRoot"/>
+      </p:par>
+    </p:tnLst>
+  </p:timing>
 </p:sld>
 </file>
 
@@ -27159,7 +27681,7 @@
   <a:extraClrSchemeLst/>
   <a:extLst>
     <a:ext uri="{05A4C25C-085E-4340-85A3-A5531E510DB2}">
-      <thm15:themeFamily xmlns="" xmlns:thm15="http://schemas.microsoft.com/office/thememl/2012/main" name="Default Theme" id="{60D8BA8C-9729-41DF-95DA-F7E2EA5BAF67}" vid="{20480253-1F85-40A7-9C79-C403C37E6553}"/>
+      <thm15:themeFamily xmlns:thm15="http://schemas.microsoft.com/office/thememl/2012/main" xmlns="" name="Default Theme" id="{60D8BA8C-9729-41DF-95DA-F7E2EA5BAF67}" vid="{20480253-1F85-40A7-9C79-C403C37E6553}"/>
     </a:ext>
   </a:extLst>
 </a:theme>

</xml_diff>